<commit_message>
CIS 343 OO slides
</commit_message>
<xml_diff>
--- a/Teaching/Courses/W23/CIS343/LectureNotes/cis343_ch9.pptx
+++ b/Teaching/Courses/W23/CIS343/LectureNotes/cis343_ch9.pptx
@@ -19463,7 +19463,7 @@
           <a:p>
             <a:pPr eaLnBrk="1" hangingPunct="1"/>
             <a:r>
-              <a:rPr lang="en-US" altLang="en-US"/>
+              <a:rPr lang="en-US" altLang="en-US" dirty="0"/>
               <a:t>Pass-by-Result (Out Mode)</a:t>
             </a:r>
           </a:p>
@@ -19501,7 +19501,7 @@
               </a:lnSpc>
             </a:pPr>
             <a:r>
-              <a:rPr lang="en-US" altLang="en-US"/>
+              <a:rPr lang="en-US" altLang="en-US" dirty="0"/>
               <a:t>When a parameter is passed by result, no value is transmitted to the subprogram; the corresponding formal parameter acts as a local variable; its value is transmitted to caller’s actual parameter when control is returned to the caller, by physical move</a:t>
             </a:r>
           </a:p>
@@ -19512,7 +19512,7 @@
               </a:lnSpc>
             </a:pPr>
             <a:r>
-              <a:rPr lang="en-US" altLang="en-US"/>
+              <a:rPr lang="en-US" altLang="en-US" dirty="0"/>
               <a:t>Require extra storage location and copy operation</a:t>
             </a:r>
           </a:p>
@@ -19523,7 +19523,7 @@
               </a:lnSpc>
             </a:pPr>
             <a:r>
-              <a:rPr lang="en-US" altLang="en-US"/>
+              <a:rPr lang="en-US" altLang="en-US" dirty="0"/>
               <a:t>Potential problems:</a:t>
             </a:r>
           </a:p>
@@ -19534,22 +19534,22 @@
               </a:lnSpc>
             </a:pPr>
             <a:r>
-              <a:rPr lang="en-US" altLang="en-US"/>
+              <a:rPr lang="en-US" altLang="en-US" dirty="0"/>
               <a:t> </a:t>
             </a:r>
             <a:r>
-              <a:rPr lang="en-US" altLang="en-US" sz="1600">
+              <a:rPr lang="en-US" altLang="en-US" sz="1600" dirty="0">
                 <a:latin typeface="Courier New" panose="02070309020205020404" pitchFamily="49" charset="0"/>
                 <a:cs typeface="Courier New" panose="02070309020205020404" pitchFamily="49" charset="0"/>
               </a:rPr>
               <a:t>sub(p1, p1); </a:t>
             </a:r>
             <a:r>
-              <a:rPr lang="en-US" altLang="en-US"/>
+              <a:rPr lang="en-US" altLang="en-US" dirty="0"/>
               <a:t>whichever formal parameter is copied back will represent the current value of </a:t>
             </a:r>
             <a:r>
-              <a:rPr lang="en-US" altLang="en-US" sz="1600">
+              <a:rPr lang="en-US" altLang="en-US" sz="1600" dirty="0">
                 <a:latin typeface="Courier New" panose="02070309020205020404" pitchFamily="49" charset="0"/>
                 <a:cs typeface="Courier New" panose="02070309020205020404" pitchFamily="49" charset="0"/>
               </a:rPr>
@@ -19563,17 +19563,30 @@
               </a:lnSpc>
             </a:pPr>
             <a:r>
-              <a:rPr lang="en-US" altLang="en-US" sz="1600">
+              <a:rPr lang="en-US" altLang="en-US" sz="1600" dirty="0">
                 <a:latin typeface="Courier New" panose="02070309020205020404" pitchFamily="49" charset="0"/>
                 <a:cs typeface="Courier New" panose="02070309020205020404" pitchFamily="49" charset="0"/>
               </a:rPr>
               <a:t>sub(list[sub], sub); </a:t>
             </a:r>
             <a:r>
-              <a:rPr lang="en-US" altLang="en-US">
+              <a:rPr lang="en-US" altLang="en-US" dirty="0">
                 <a:cs typeface="Courier New" panose="02070309020205020404" pitchFamily="49" charset="0"/>
               </a:rPr>
-              <a:t>Compute address of list[sub] at the beginning of the subprogram or end?</a:t>
+              <a:t>Compute address of </a:t>
+            </a:r>
+            <a:r>
+              <a:rPr lang="en-US" altLang="en-US" sz="2000" dirty="0">
+                <a:latin typeface="Courier New" panose="02070309020205020404" pitchFamily="49" charset="0"/>
+                <a:cs typeface="Courier New" panose="02070309020205020404" pitchFamily="49" charset="0"/>
+              </a:rPr>
+              <a:t>list[sub] </a:t>
+            </a:r>
+            <a:r>
+              <a:rPr lang="en-US" altLang="en-US" dirty="0">
+                <a:cs typeface="Courier New" panose="02070309020205020404" pitchFamily="49" charset="0"/>
+              </a:rPr>
+              <a:t>at the beginning of the subprogram or end?</a:t>
             </a:r>
           </a:p>
         </p:txBody>

</xml_diff>